<commit_message>
Added content and phootooos
</commit_message>
<xml_diff>
--- a/Admin/presentation/Team_Ganges_Presentation.pptx
+++ b/Admin/presentation/Team_Ganges_Presentation.pptx
@@ -2,12 +2,20 @@
 <file path=ppt/presentation.xml><?xml version="1.0" encoding="utf-8"?>
 <p:presentation xmlns:a="http://schemas.openxmlformats.org/drawingml/2006/main" xmlns:r="http://schemas.openxmlformats.org/officeDocument/2006/relationships" xmlns:p="http://schemas.openxmlformats.org/presentationml/2006/main" saveSubsetFonts="1">
   <p:sldMasterIdLst>
-    <p:sldMasterId id="2147483648" r:id="rId1"/>
+    <p:sldMasterId id="2147483672" r:id="rId1"/>
   </p:sldMasterIdLst>
+  <p:notesMasterIdLst>
+    <p:notesMasterId r:id="rId10"/>
+  </p:notesMasterIdLst>
   <p:sldIdLst>
     <p:sldId id="256" r:id="rId2"/>
     <p:sldId id="257" r:id="rId3"/>
     <p:sldId id="258" r:id="rId4"/>
+    <p:sldId id="259" r:id="rId5"/>
+    <p:sldId id="263" r:id="rId6"/>
+    <p:sldId id="262" r:id="rId7"/>
+    <p:sldId id="260" r:id="rId8"/>
+    <p:sldId id="261" r:id="rId9"/>
   </p:sldIdLst>
   <p:sldSz cx="12192000" cy="6858000"/>
   <p:notesSz cx="6858000" cy="9144000"/>
@@ -106,7 +114,556 @@
       </a:defRPr>
     </a:lvl9pPr>
   </p:defaultTextStyle>
+  <p:extLst>
+    <p:ext uri="{EFAFB233-063F-42B5-8137-9DF3F51BA10A}">
+      <p15:sldGuideLst xmlns:p15="http://schemas.microsoft.com/office/powerpoint/2012/main"/>
+    </p:ext>
+  </p:extLst>
 </p:presentation>
+</file>
+
+<file path=ppt/notesMasters/notesMaster1.xml><?xml version="1.0" encoding="utf-8"?>
+<p:notesMaster xmlns:a="http://schemas.openxmlformats.org/drawingml/2006/main" xmlns:r="http://schemas.openxmlformats.org/officeDocument/2006/relationships" xmlns:p="http://schemas.openxmlformats.org/presentationml/2006/main">
+  <p:cSld>
+    <p:bg>
+      <p:bgRef idx="1001">
+        <a:schemeClr val="bg1"/>
+      </p:bgRef>
+    </p:bg>
+    <p:spTree>
+      <p:nvGrpSpPr>
+        <p:cNvPr id="1" name=""/>
+        <p:cNvGrpSpPr/>
+        <p:nvPr/>
+      </p:nvGrpSpPr>
+      <p:grpSpPr>
+        <a:xfrm>
+          <a:off x="0" y="0"/>
+          <a:ext cx="0" cy="0"/>
+          <a:chOff x="0" y="0"/>
+          <a:chExt cx="0" cy="0"/>
+        </a:xfrm>
+      </p:grpSpPr>
+      <p:sp>
+        <p:nvSpPr>
+          <p:cNvPr id="2" name="Header Placeholder 1"/>
+          <p:cNvSpPr>
+            <a:spLocks noGrp="1"/>
+          </p:cNvSpPr>
+          <p:nvPr>
+            <p:ph type="hdr" sz="quarter"/>
+          </p:nvPr>
+        </p:nvSpPr>
+        <p:spPr>
+          <a:xfrm>
+            <a:off x="0" y="0"/>
+            <a:ext cx="2971800" cy="458788"/>
+          </a:xfrm>
+          <a:prstGeom prst="rect">
+            <a:avLst/>
+          </a:prstGeom>
+        </p:spPr>
+        <p:txBody>
+          <a:bodyPr vert="horz" lIns="91440" tIns="45720" rIns="91440" bIns="45720" rtlCol="0"/>
+          <a:lstStyle>
+            <a:lvl1pPr algn="l">
+              <a:defRPr sz="1200"/>
+            </a:lvl1pPr>
+          </a:lstStyle>
+          <a:p>
+            <a:endParaRPr lang="en-GB"/>
+          </a:p>
+        </p:txBody>
+      </p:sp>
+      <p:sp>
+        <p:nvSpPr>
+          <p:cNvPr id="3" name="Date Placeholder 2"/>
+          <p:cNvSpPr>
+            <a:spLocks noGrp="1"/>
+          </p:cNvSpPr>
+          <p:nvPr>
+            <p:ph type="dt" idx="1"/>
+          </p:nvPr>
+        </p:nvSpPr>
+        <p:spPr>
+          <a:xfrm>
+            <a:off x="3884613" y="0"/>
+            <a:ext cx="2971800" cy="458788"/>
+          </a:xfrm>
+          <a:prstGeom prst="rect">
+            <a:avLst/>
+          </a:prstGeom>
+        </p:spPr>
+        <p:txBody>
+          <a:bodyPr vert="horz" lIns="91440" tIns="45720" rIns="91440" bIns="45720" rtlCol="0"/>
+          <a:lstStyle>
+            <a:lvl1pPr algn="r">
+              <a:defRPr sz="1200"/>
+            </a:lvl1pPr>
+          </a:lstStyle>
+          <a:p>
+            <a:fld id="{6F797DE0-C487-46B2-B266-2B1B9EB624CE}" type="datetimeFigureOut">
+              <a:rPr lang="en-GB" smtClean="0"/>
+              <a:t>21/03/2017</a:t>
+            </a:fld>
+            <a:endParaRPr lang="en-GB"/>
+          </a:p>
+        </p:txBody>
+      </p:sp>
+      <p:sp>
+        <p:nvSpPr>
+          <p:cNvPr id="4" name="Slide Image Placeholder 3"/>
+          <p:cNvSpPr>
+            <a:spLocks noGrp="1" noRot="1" noChangeAspect="1"/>
+          </p:cNvSpPr>
+          <p:nvPr>
+            <p:ph type="sldImg" idx="2"/>
+          </p:nvPr>
+        </p:nvSpPr>
+        <p:spPr>
+          <a:xfrm>
+            <a:off x="685800" y="1143000"/>
+            <a:ext cx="5486400" cy="3086100"/>
+          </a:xfrm>
+          <a:prstGeom prst="rect">
+            <a:avLst/>
+          </a:prstGeom>
+          <a:noFill/>
+          <a:ln w="12700">
+            <a:solidFill>
+              <a:prstClr val="black"/>
+            </a:solidFill>
+          </a:ln>
+        </p:spPr>
+        <p:txBody>
+          <a:bodyPr vert="horz" lIns="91440" tIns="45720" rIns="91440" bIns="45720" rtlCol="0" anchor="ctr"/>
+          <a:lstStyle/>
+          <a:p>
+            <a:endParaRPr lang="en-GB"/>
+          </a:p>
+        </p:txBody>
+      </p:sp>
+      <p:sp>
+        <p:nvSpPr>
+          <p:cNvPr id="5" name="Notes Placeholder 4"/>
+          <p:cNvSpPr>
+            <a:spLocks noGrp="1"/>
+          </p:cNvSpPr>
+          <p:nvPr>
+            <p:ph type="body" sz="quarter" idx="3"/>
+          </p:nvPr>
+        </p:nvSpPr>
+        <p:spPr>
+          <a:xfrm>
+            <a:off x="685800" y="4400550"/>
+            <a:ext cx="5486400" cy="3600450"/>
+          </a:xfrm>
+          <a:prstGeom prst="rect">
+            <a:avLst/>
+          </a:prstGeom>
+        </p:spPr>
+        <p:txBody>
+          <a:bodyPr vert="horz" lIns="91440" tIns="45720" rIns="91440" bIns="45720" rtlCol="0"/>
+          <a:lstStyle/>
+          <a:p>
+            <a:pPr lvl="0"/>
+            <a:r>
+              <a:rPr lang="en-US" smtClean="0"/>
+              <a:t>Edit Master text styles</a:t>
+            </a:r>
+          </a:p>
+          <a:p>
+            <a:pPr lvl="1"/>
+            <a:r>
+              <a:rPr lang="en-US" smtClean="0"/>
+              <a:t>Second level</a:t>
+            </a:r>
+          </a:p>
+          <a:p>
+            <a:pPr lvl="2"/>
+            <a:r>
+              <a:rPr lang="en-US" smtClean="0"/>
+              <a:t>Third level</a:t>
+            </a:r>
+          </a:p>
+          <a:p>
+            <a:pPr lvl="3"/>
+            <a:r>
+              <a:rPr lang="en-US" smtClean="0"/>
+              <a:t>Fourth level</a:t>
+            </a:r>
+          </a:p>
+          <a:p>
+            <a:pPr lvl="4"/>
+            <a:r>
+              <a:rPr lang="en-US" smtClean="0"/>
+              <a:t>Fifth level</a:t>
+            </a:r>
+            <a:endParaRPr lang="en-GB"/>
+          </a:p>
+        </p:txBody>
+      </p:sp>
+      <p:sp>
+        <p:nvSpPr>
+          <p:cNvPr id="6" name="Footer Placeholder 5"/>
+          <p:cNvSpPr>
+            <a:spLocks noGrp="1"/>
+          </p:cNvSpPr>
+          <p:nvPr>
+            <p:ph type="ftr" sz="quarter" idx="4"/>
+          </p:nvPr>
+        </p:nvSpPr>
+        <p:spPr>
+          <a:xfrm>
+            <a:off x="0" y="8685213"/>
+            <a:ext cx="2971800" cy="458787"/>
+          </a:xfrm>
+          <a:prstGeom prst="rect">
+            <a:avLst/>
+          </a:prstGeom>
+        </p:spPr>
+        <p:txBody>
+          <a:bodyPr vert="horz" lIns="91440" tIns="45720" rIns="91440" bIns="45720" rtlCol="0" anchor="b"/>
+          <a:lstStyle>
+            <a:lvl1pPr algn="l">
+              <a:defRPr sz="1200"/>
+            </a:lvl1pPr>
+          </a:lstStyle>
+          <a:p>
+            <a:endParaRPr lang="en-GB"/>
+          </a:p>
+        </p:txBody>
+      </p:sp>
+      <p:sp>
+        <p:nvSpPr>
+          <p:cNvPr id="7" name="Slide Number Placeholder 6"/>
+          <p:cNvSpPr>
+            <a:spLocks noGrp="1"/>
+          </p:cNvSpPr>
+          <p:nvPr>
+            <p:ph type="sldNum" sz="quarter" idx="5"/>
+          </p:nvPr>
+        </p:nvSpPr>
+        <p:spPr>
+          <a:xfrm>
+            <a:off x="3884613" y="8685213"/>
+            <a:ext cx="2971800" cy="458787"/>
+          </a:xfrm>
+          <a:prstGeom prst="rect">
+            <a:avLst/>
+          </a:prstGeom>
+        </p:spPr>
+        <p:txBody>
+          <a:bodyPr vert="horz" lIns="91440" tIns="45720" rIns="91440" bIns="45720" rtlCol="0" anchor="b"/>
+          <a:lstStyle>
+            <a:lvl1pPr algn="r">
+              <a:defRPr sz="1200"/>
+            </a:lvl1pPr>
+          </a:lstStyle>
+          <a:p>
+            <a:fld id="{2F5502CF-19E4-47D3-871A-24A881BC9F8C}" type="slidenum">
+              <a:rPr lang="en-GB" smtClean="0"/>
+              <a:t>‹#›</a:t>
+            </a:fld>
+            <a:endParaRPr lang="en-GB"/>
+          </a:p>
+        </p:txBody>
+      </p:sp>
+    </p:spTree>
+    <p:extLst>
+      <p:ext uri="{BB962C8B-B14F-4D97-AF65-F5344CB8AC3E}">
+        <p14:creationId xmlns:p14="http://schemas.microsoft.com/office/powerpoint/2010/main" val="607093965"/>
+      </p:ext>
+    </p:extLst>
+  </p:cSld>
+  <p:clrMap bg1="lt1" tx1="dk1" bg2="lt2" tx2="dk2" accent1="accent1" accent2="accent2" accent3="accent3" accent4="accent4" accent5="accent5" accent6="accent6" hlink="hlink" folHlink="folHlink"/>
+  <p:notesStyle>
+    <a:lvl1pPr marL="0" algn="l" defTabSz="914400" rtl="0" eaLnBrk="1" latinLnBrk="0" hangingPunct="1">
+      <a:defRPr sz="1200" kern="1200">
+        <a:solidFill>
+          <a:schemeClr val="tx1"/>
+        </a:solidFill>
+        <a:latin typeface="+mn-lt"/>
+        <a:ea typeface="+mn-ea"/>
+        <a:cs typeface="+mn-cs"/>
+      </a:defRPr>
+    </a:lvl1pPr>
+    <a:lvl2pPr marL="457200" algn="l" defTabSz="914400" rtl="0" eaLnBrk="1" latinLnBrk="0" hangingPunct="1">
+      <a:defRPr sz="1200" kern="1200">
+        <a:solidFill>
+          <a:schemeClr val="tx1"/>
+        </a:solidFill>
+        <a:latin typeface="+mn-lt"/>
+        <a:ea typeface="+mn-ea"/>
+        <a:cs typeface="+mn-cs"/>
+      </a:defRPr>
+    </a:lvl2pPr>
+    <a:lvl3pPr marL="914400" algn="l" defTabSz="914400" rtl="0" eaLnBrk="1" latinLnBrk="0" hangingPunct="1">
+      <a:defRPr sz="1200" kern="1200">
+        <a:solidFill>
+          <a:schemeClr val="tx1"/>
+        </a:solidFill>
+        <a:latin typeface="+mn-lt"/>
+        <a:ea typeface="+mn-ea"/>
+        <a:cs typeface="+mn-cs"/>
+      </a:defRPr>
+    </a:lvl3pPr>
+    <a:lvl4pPr marL="1371600" algn="l" defTabSz="914400" rtl="0" eaLnBrk="1" latinLnBrk="0" hangingPunct="1">
+      <a:defRPr sz="1200" kern="1200">
+        <a:solidFill>
+          <a:schemeClr val="tx1"/>
+        </a:solidFill>
+        <a:latin typeface="+mn-lt"/>
+        <a:ea typeface="+mn-ea"/>
+        <a:cs typeface="+mn-cs"/>
+      </a:defRPr>
+    </a:lvl4pPr>
+    <a:lvl5pPr marL="1828800" algn="l" defTabSz="914400" rtl="0" eaLnBrk="1" latinLnBrk="0" hangingPunct="1">
+      <a:defRPr sz="1200" kern="1200">
+        <a:solidFill>
+          <a:schemeClr val="tx1"/>
+        </a:solidFill>
+        <a:latin typeface="+mn-lt"/>
+        <a:ea typeface="+mn-ea"/>
+        <a:cs typeface="+mn-cs"/>
+      </a:defRPr>
+    </a:lvl5pPr>
+    <a:lvl6pPr marL="2286000" algn="l" defTabSz="914400" rtl="0" eaLnBrk="1" latinLnBrk="0" hangingPunct="1">
+      <a:defRPr sz="1200" kern="1200">
+        <a:solidFill>
+          <a:schemeClr val="tx1"/>
+        </a:solidFill>
+        <a:latin typeface="+mn-lt"/>
+        <a:ea typeface="+mn-ea"/>
+        <a:cs typeface="+mn-cs"/>
+      </a:defRPr>
+    </a:lvl6pPr>
+    <a:lvl7pPr marL="2743200" algn="l" defTabSz="914400" rtl="0" eaLnBrk="1" latinLnBrk="0" hangingPunct="1">
+      <a:defRPr sz="1200" kern="1200">
+        <a:solidFill>
+          <a:schemeClr val="tx1"/>
+        </a:solidFill>
+        <a:latin typeface="+mn-lt"/>
+        <a:ea typeface="+mn-ea"/>
+        <a:cs typeface="+mn-cs"/>
+      </a:defRPr>
+    </a:lvl7pPr>
+    <a:lvl8pPr marL="3200400" algn="l" defTabSz="914400" rtl="0" eaLnBrk="1" latinLnBrk="0" hangingPunct="1">
+      <a:defRPr sz="1200" kern="1200">
+        <a:solidFill>
+          <a:schemeClr val="tx1"/>
+        </a:solidFill>
+        <a:latin typeface="+mn-lt"/>
+        <a:ea typeface="+mn-ea"/>
+        <a:cs typeface="+mn-cs"/>
+      </a:defRPr>
+    </a:lvl8pPr>
+    <a:lvl9pPr marL="3657600" algn="l" defTabSz="914400" rtl="0" eaLnBrk="1" latinLnBrk="0" hangingPunct="1">
+      <a:defRPr sz="1200" kern="1200">
+        <a:solidFill>
+          <a:schemeClr val="tx1"/>
+        </a:solidFill>
+        <a:latin typeface="+mn-lt"/>
+        <a:ea typeface="+mn-ea"/>
+        <a:cs typeface="+mn-cs"/>
+      </a:defRPr>
+    </a:lvl9pPr>
+  </p:notesStyle>
+</p:notesMaster>
+</file>
+
+<file path=ppt/notesSlides/notesSlide1.xml><?xml version="1.0" encoding="utf-8"?>
+<p:notes xmlns:a="http://schemas.openxmlformats.org/drawingml/2006/main" xmlns:r="http://schemas.openxmlformats.org/officeDocument/2006/relationships" xmlns:p="http://schemas.openxmlformats.org/presentationml/2006/main">
+  <p:cSld>
+    <p:spTree>
+      <p:nvGrpSpPr>
+        <p:cNvPr id="1" name=""/>
+        <p:cNvGrpSpPr/>
+        <p:nvPr/>
+      </p:nvGrpSpPr>
+      <p:grpSpPr>
+        <a:xfrm>
+          <a:off x="0" y="0"/>
+          <a:ext cx="0" cy="0"/>
+          <a:chOff x="0" y="0"/>
+          <a:chExt cx="0" cy="0"/>
+        </a:xfrm>
+      </p:grpSpPr>
+      <p:sp>
+        <p:nvSpPr>
+          <p:cNvPr id="2" name="Slide Image Placeholder 1"/>
+          <p:cNvSpPr>
+            <a:spLocks noGrp="1" noRot="1" noChangeAspect="1"/>
+          </p:cNvSpPr>
+          <p:nvPr>
+            <p:ph type="sldImg"/>
+          </p:nvPr>
+        </p:nvSpPr>
+        <p:spPr/>
+      </p:sp>
+      <p:sp>
+        <p:nvSpPr>
+          <p:cNvPr id="3" name="Notes Placeholder 2"/>
+          <p:cNvSpPr>
+            <a:spLocks noGrp="1"/>
+          </p:cNvSpPr>
+          <p:nvPr>
+            <p:ph type="body" idx="1"/>
+          </p:nvPr>
+        </p:nvSpPr>
+        <p:spPr/>
+        <p:txBody>
+          <a:bodyPr/>
+          <a:lstStyle/>
+          <a:p>
+            <a:r>
+              <a:rPr lang="en-GB" dirty="0" smtClean="0"/>
+              <a:t>INSERT TEAM PHOTO HERE!</a:t>
+            </a:r>
+          </a:p>
+        </p:txBody>
+      </p:sp>
+      <p:sp>
+        <p:nvSpPr>
+          <p:cNvPr id="4" name="Slide Number Placeholder 3"/>
+          <p:cNvSpPr>
+            <a:spLocks noGrp="1"/>
+          </p:cNvSpPr>
+          <p:nvPr>
+            <p:ph type="sldNum" sz="quarter" idx="10"/>
+          </p:nvPr>
+        </p:nvSpPr>
+        <p:spPr/>
+        <p:txBody>
+          <a:bodyPr/>
+          <a:lstStyle/>
+          <a:p>
+            <a:fld id="{2F5502CF-19E4-47D3-871A-24A881BC9F8C}" type="slidenum">
+              <a:rPr lang="en-GB" smtClean="0"/>
+              <a:t>2</a:t>
+            </a:fld>
+            <a:endParaRPr lang="en-GB"/>
+          </a:p>
+        </p:txBody>
+      </p:sp>
+    </p:spTree>
+    <p:extLst>
+      <p:ext uri="{BB962C8B-B14F-4D97-AF65-F5344CB8AC3E}">
+        <p14:creationId xmlns:p14="http://schemas.microsoft.com/office/powerpoint/2010/main" val="408306329"/>
+      </p:ext>
+    </p:extLst>
+  </p:cSld>
+  <p:clrMapOvr>
+    <a:masterClrMapping/>
+  </p:clrMapOvr>
+</p:notes>
+</file>
+
+<file path=ppt/notesSlides/notesSlide2.xml><?xml version="1.0" encoding="utf-8"?>
+<p:notes xmlns:a="http://schemas.openxmlformats.org/drawingml/2006/main" xmlns:r="http://schemas.openxmlformats.org/officeDocument/2006/relationships" xmlns:p="http://schemas.openxmlformats.org/presentationml/2006/main">
+  <p:cSld>
+    <p:spTree>
+      <p:nvGrpSpPr>
+        <p:cNvPr id="1" name=""/>
+        <p:cNvGrpSpPr/>
+        <p:nvPr/>
+      </p:nvGrpSpPr>
+      <p:grpSpPr>
+        <a:xfrm>
+          <a:off x="0" y="0"/>
+          <a:ext cx="0" cy="0"/>
+          <a:chOff x="0" y="0"/>
+          <a:chExt cx="0" cy="0"/>
+        </a:xfrm>
+      </p:grpSpPr>
+      <p:sp>
+        <p:nvSpPr>
+          <p:cNvPr id="2" name="Slide Image Placeholder 1"/>
+          <p:cNvSpPr>
+            <a:spLocks noGrp="1" noRot="1" noChangeAspect="1"/>
+          </p:cNvSpPr>
+          <p:nvPr>
+            <p:ph type="sldImg"/>
+          </p:nvPr>
+        </p:nvSpPr>
+        <p:spPr/>
+      </p:sp>
+      <p:sp>
+        <p:nvSpPr>
+          <p:cNvPr id="3" name="Notes Placeholder 2"/>
+          <p:cNvSpPr>
+            <a:spLocks noGrp="1"/>
+          </p:cNvSpPr>
+          <p:nvPr>
+            <p:ph type="body" idx="1"/>
+          </p:nvPr>
+        </p:nvSpPr>
+        <p:spPr/>
+        <p:txBody>
+          <a:bodyPr/>
+          <a:lstStyle/>
+          <a:p>
+            <a:pPr marL="0" marR="0" lvl="0" indent="0" algn="l" defTabSz="914400" rtl="0" eaLnBrk="1" fontAlgn="auto" latinLnBrk="0" hangingPunct="1">
+              <a:lnSpc>
+                <a:spcPct val="100000"/>
+              </a:lnSpc>
+              <a:spcBef>
+                <a:spcPts val="0"/>
+              </a:spcBef>
+              <a:spcAft>
+                <a:spcPts val="0"/>
+              </a:spcAft>
+              <a:buClrTx/>
+              <a:buSzTx/>
+              <a:buFontTx/>
+              <a:buNone/>
+              <a:tabLst/>
+              <a:defRPr/>
+            </a:pPr>
+            <a:r>
+              <a:rPr lang="en-GB" dirty="0" smtClean="0"/>
+              <a:t>With a few more hours of tuning and debugging we could achieve stable flight</a:t>
+            </a:r>
+          </a:p>
+          <a:p>
+            <a:endParaRPr lang="en-GB" dirty="0"/>
+          </a:p>
+        </p:txBody>
+      </p:sp>
+      <p:sp>
+        <p:nvSpPr>
+          <p:cNvPr id="4" name="Slide Number Placeholder 3"/>
+          <p:cNvSpPr>
+            <a:spLocks noGrp="1"/>
+          </p:cNvSpPr>
+          <p:nvPr>
+            <p:ph type="sldNum" sz="quarter" idx="10"/>
+          </p:nvPr>
+        </p:nvSpPr>
+        <p:spPr/>
+        <p:txBody>
+          <a:bodyPr/>
+          <a:lstStyle/>
+          <a:p>
+            <a:fld id="{2F5502CF-19E4-47D3-871A-24A881BC9F8C}" type="slidenum">
+              <a:rPr lang="en-GB" smtClean="0"/>
+              <a:t>8</a:t>
+            </a:fld>
+            <a:endParaRPr lang="en-GB"/>
+          </a:p>
+        </p:txBody>
+      </p:sp>
+    </p:spTree>
+    <p:extLst>
+      <p:ext uri="{BB962C8B-B14F-4D97-AF65-F5344CB8AC3E}">
+        <p14:creationId xmlns:p14="http://schemas.microsoft.com/office/powerpoint/2010/main" val="974790255"/>
+      </p:ext>
+    </p:extLst>
+  </p:cSld>
+  <p:clrMapOvr>
+    <a:masterClrMapping/>
+  </p:clrMapOvr>
+</p:notes>
 </file>
 
 <file path=ppt/slideLayouts/slideLayout1.xml><?xml version="1.0" encoding="utf-8"?>
@@ -291,7 +848,7 @@
     </p:spTree>
     <p:extLst>
       <p:ext uri="{BB962C8B-B14F-4D97-AF65-F5344CB8AC3E}">
-        <p14:creationId xmlns:p14="http://schemas.microsoft.com/office/powerpoint/2010/main" val="4250133615"/>
+        <p14:creationId xmlns:p14="http://schemas.microsoft.com/office/powerpoint/2010/main" val="4167456467"/>
       </p:ext>
     </p:extLst>
   </p:cSld>
@@ -461,7 +1018,7 @@
     </p:spTree>
     <p:extLst>
       <p:ext uri="{BB962C8B-B14F-4D97-AF65-F5344CB8AC3E}">
-        <p14:creationId xmlns:p14="http://schemas.microsoft.com/office/powerpoint/2010/main" val="376997394"/>
+        <p14:creationId xmlns:p14="http://schemas.microsoft.com/office/powerpoint/2010/main" val="3166906014"/>
       </p:ext>
     </p:extLst>
   </p:cSld>
@@ -641,7 +1198,7 @@
     </p:spTree>
     <p:extLst>
       <p:ext uri="{BB962C8B-B14F-4D97-AF65-F5344CB8AC3E}">
-        <p14:creationId xmlns:p14="http://schemas.microsoft.com/office/powerpoint/2010/main" val="1805901105"/>
+        <p14:creationId xmlns:p14="http://schemas.microsoft.com/office/powerpoint/2010/main" val="908733036"/>
       </p:ext>
     </p:extLst>
   </p:cSld>
@@ -811,7 +1368,7 @@
     </p:spTree>
     <p:extLst>
       <p:ext uri="{BB962C8B-B14F-4D97-AF65-F5344CB8AC3E}">
-        <p14:creationId xmlns:p14="http://schemas.microsoft.com/office/powerpoint/2010/main" val="635830857"/>
+        <p14:creationId xmlns:p14="http://schemas.microsoft.com/office/powerpoint/2010/main" val="1079968111"/>
       </p:ext>
     </p:extLst>
   </p:cSld>
@@ -1057,7 +1614,7 @@
     </p:spTree>
     <p:extLst>
       <p:ext uri="{BB962C8B-B14F-4D97-AF65-F5344CB8AC3E}">
-        <p14:creationId xmlns:p14="http://schemas.microsoft.com/office/powerpoint/2010/main" val="3018281364"/>
+        <p14:creationId xmlns:p14="http://schemas.microsoft.com/office/powerpoint/2010/main" val="4112591769"/>
       </p:ext>
     </p:extLst>
   </p:cSld>
@@ -1289,7 +1846,7 @@
     </p:spTree>
     <p:extLst>
       <p:ext uri="{BB962C8B-B14F-4D97-AF65-F5344CB8AC3E}">
-        <p14:creationId xmlns:p14="http://schemas.microsoft.com/office/powerpoint/2010/main" val="2417657664"/>
+        <p14:creationId xmlns:p14="http://schemas.microsoft.com/office/powerpoint/2010/main" val="989266571"/>
       </p:ext>
     </p:extLst>
   </p:cSld>
@@ -1656,7 +2213,7 @@
     </p:spTree>
     <p:extLst>
       <p:ext uri="{BB962C8B-B14F-4D97-AF65-F5344CB8AC3E}">
-        <p14:creationId xmlns:p14="http://schemas.microsoft.com/office/powerpoint/2010/main" val="1668312704"/>
+        <p14:creationId xmlns:p14="http://schemas.microsoft.com/office/powerpoint/2010/main" val="4253214447"/>
       </p:ext>
     </p:extLst>
   </p:cSld>
@@ -1774,7 +2331,7 @@
     </p:spTree>
     <p:extLst>
       <p:ext uri="{BB962C8B-B14F-4D97-AF65-F5344CB8AC3E}">
-        <p14:creationId xmlns:p14="http://schemas.microsoft.com/office/powerpoint/2010/main" val="1912241341"/>
+        <p14:creationId xmlns:p14="http://schemas.microsoft.com/office/powerpoint/2010/main" val="377093527"/>
       </p:ext>
     </p:extLst>
   </p:cSld>
@@ -1869,7 +2426,7 @@
     </p:spTree>
     <p:extLst>
       <p:ext uri="{BB962C8B-B14F-4D97-AF65-F5344CB8AC3E}">
-        <p14:creationId xmlns:p14="http://schemas.microsoft.com/office/powerpoint/2010/main" val="922059127"/>
+        <p14:creationId xmlns:p14="http://schemas.microsoft.com/office/powerpoint/2010/main" val="3039987996"/>
       </p:ext>
     </p:extLst>
   </p:cSld>
@@ -2146,7 +2703,7 @@
     </p:spTree>
     <p:extLst>
       <p:ext uri="{BB962C8B-B14F-4D97-AF65-F5344CB8AC3E}">
-        <p14:creationId xmlns:p14="http://schemas.microsoft.com/office/powerpoint/2010/main" val="2089178210"/>
+        <p14:creationId xmlns:p14="http://schemas.microsoft.com/office/powerpoint/2010/main" val="2557041501"/>
       </p:ext>
     </p:extLst>
   </p:cSld>
@@ -2399,7 +2956,7 @@
     </p:spTree>
     <p:extLst>
       <p:ext uri="{BB962C8B-B14F-4D97-AF65-F5344CB8AC3E}">
-        <p14:creationId xmlns:p14="http://schemas.microsoft.com/office/powerpoint/2010/main" val="3740028274"/>
+        <p14:creationId xmlns:p14="http://schemas.microsoft.com/office/powerpoint/2010/main" val="2586997207"/>
       </p:ext>
     </p:extLst>
   </p:cSld>
@@ -2648,23 +3205,23 @@
     </p:spTree>
     <p:extLst>
       <p:ext uri="{BB962C8B-B14F-4D97-AF65-F5344CB8AC3E}">
-        <p14:creationId xmlns:p14="http://schemas.microsoft.com/office/powerpoint/2010/main" val="4044124030"/>
+        <p14:creationId xmlns:p14="http://schemas.microsoft.com/office/powerpoint/2010/main" val="988587262"/>
       </p:ext>
     </p:extLst>
   </p:cSld>
   <p:clrMap bg1="lt1" tx1="dk1" bg2="lt2" tx2="dk2" accent1="accent1" accent2="accent2" accent3="accent3" accent4="accent4" accent5="accent5" accent6="accent6" hlink="hlink" folHlink="folHlink"/>
   <p:sldLayoutIdLst>
-    <p:sldLayoutId id="2147483649" r:id="rId1"/>
-    <p:sldLayoutId id="2147483650" r:id="rId2"/>
-    <p:sldLayoutId id="2147483651" r:id="rId3"/>
-    <p:sldLayoutId id="2147483652" r:id="rId4"/>
-    <p:sldLayoutId id="2147483653" r:id="rId5"/>
-    <p:sldLayoutId id="2147483654" r:id="rId6"/>
-    <p:sldLayoutId id="2147483655" r:id="rId7"/>
-    <p:sldLayoutId id="2147483656" r:id="rId8"/>
-    <p:sldLayoutId id="2147483657" r:id="rId9"/>
-    <p:sldLayoutId id="2147483658" r:id="rId10"/>
-    <p:sldLayoutId id="2147483659" r:id="rId11"/>
+    <p:sldLayoutId id="2147483673" r:id="rId1"/>
+    <p:sldLayoutId id="2147483674" r:id="rId2"/>
+    <p:sldLayoutId id="2147483675" r:id="rId3"/>
+    <p:sldLayoutId id="2147483676" r:id="rId4"/>
+    <p:sldLayoutId id="2147483677" r:id="rId5"/>
+    <p:sldLayoutId id="2147483678" r:id="rId6"/>
+    <p:sldLayoutId id="2147483679" r:id="rId7"/>
+    <p:sldLayoutId id="2147483680" r:id="rId8"/>
+    <p:sldLayoutId id="2147483681" r:id="rId9"/>
+    <p:sldLayoutId id="2147483682" r:id="rId10"/>
+    <p:sldLayoutId id="2147483683" r:id="rId11"/>
   </p:sldLayoutIdLst>
   <p:txStyles>
     <p:titleStyle>
@@ -2983,6 +3540,7 @@
           </a:bodyPr>
           <a:lstStyle/>
           <a:p>
+            <a:pPr algn="l"/>
             <a:r>
               <a:rPr lang="en-GB" dirty="0" smtClean="0"/>
               <a:t>D4 - System Design Exercise </a:t>
@@ -3016,14 +3574,49 @@
           <a:bodyPr/>
           <a:lstStyle/>
           <a:p>
-            <a:r>
-              <a:rPr lang="en-GB" dirty="0" smtClean="0"/>
-              <a:t>Team Ganges</a:t>
+            <a:pPr algn="l"/>
+            <a:r>
+              <a:rPr lang="en-GB" dirty="0" smtClean="0"/>
+              <a:t>Team </a:t>
+            </a:r>
+            <a:r>
+              <a:rPr lang="en-GB" dirty="0" smtClean="0"/>
+              <a:t>Ganges</a:t>
+            </a:r>
+          </a:p>
+          <a:p>
+            <a:pPr algn="l"/>
+            <a:r>
+              <a:rPr lang="en-GB" dirty="0" smtClean="0"/>
+              <a:t>24/03/2017</a:t>
             </a:r>
             <a:endParaRPr lang="en-GB" dirty="0"/>
           </a:p>
         </p:txBody>
       </p:sp>
+      <p:pic>
+        <p:nvPicPr>
+          <p:cNvPr id="5" name="Picture 4"/>
+          <p:cNvPicPr>
+            <a:picLocks noChangeAspect="1"/>
+          </p:cNvPicPr>
+          <p:nvPr/>
+        </p:nvPicPr>
+        <p:blipFill rotWithShape="1">
+          <a:blip r:embed="rId2"/>
+          <a:srcRect l="56172" t="10278" r="6406" b="14861"/>
+          <a:stretch/>
+        </p:blipFill>
+        <p:spPr>
+          <a:xfrm>
+            <a:off x="5208050" y="2934968"/>
+            <a:ext cx="6983950" cy="3929382"/>
+          </a:xfrm>
+          <a:prstGeom prst="rect">
+            <a:avLst/>
+          </a:prstGeom>
+        </p:spPr>
+      </p:pic>
     </p:spTree>
     <p:extLst>
       <p:ext uri="{BB962C8B-B14F-4D97-AF65-F5344CB8AC3E}">
@@ -3034,6 +3627,13 @@
   <p:clrMapOvr>
     <a:masterClrMapping/>
   </p:clrMapOvr>
+  <p:timing>
+    <p:tnLst>
+      <p:par>
+        <p:cTn id="1" dur="indefinite" restart="never" nodeType="tmRoot"/>
+      </p:par>
+    </p:tnLst>
+  </p:timing>
 </p:sld>
 </file>
 
@@ -3131,15 +3731,24 @@
             </a:r>
             <a:r>
               <a:rPr lang="en-GB" dirty="0" smtClean="0"/>
-              <a:t> - Communications</a:t>
+              <a:t> </a:t>
+            </a:r>
+            <a:r>
+              <a:rPr lang="en-GB" dirty="0" smtClean="0"/>
+              <a:t>– Communications, Encryption</a:t>
             </a:r>
             <a:endParaRPr lang="en-GB" dirty="0" smtClean="0"/>
           </a:p>
           <a:p>
             <a:r>
               <a:rPr lang="en-GB" dirty="0" smtClean="0"/>
-              <a:t>Mohammed Ibrahim - Communications</a:t>
-            </a:r>
+              <a:t>Mohammed Ibrahim </a:t>
+            </a:r>
+            <a:r>
+              <a:rPr lang="en-GB" dirty="0" smtClean="0"/>
+              <a:t>– Communications, User Interface</a:t>
+            </a:r>
+            <a:endParaRPr lang="en-GB" dirty="0" smtClean="0"/>
           </a:p>
           <a:p>
             <a:r>
@@ -3159,6 +3768,13 @@
   <p:clrMapOvr>
     <a:masterClrMapping/>
   </p:clrMapOvr>
+  <p:timing>
+    <p:tnLst>
+      <p:par>
+        <p:cTn id="1" dur="indefinite" restart="never" nodeType="tmRoot"/>
+      </p:par>
+    </p:tnLst>
+  </p:timing>
 </p:sld>
 </file>
 
@@ -3219,20 +3835,147 @@
           <a:p>
             <a:r>
               <a:rPr lang="en-GB" dirty="0" smtClean="0"/>
-              <a:t>“To design and build an unmanned aerial vehicle (UAV) that can pickup, carry </a:t>
-            </a:r>
-            <a:r>
-              <a:rPr lang="en-GB" smtClean="0"/>
-              <a:t>and drop-off </a:t>
-            </a:r>
-            <a:r>
-              <a:rPr lang="en-GB" dirty="0" smtClean="0"/>
-              <a:t>a cargo”</a:t>
-            </a:r>
+              <a:t>“To design and build an unmanned aerial vehicle (UAV) that can pickup, carry and drop-off a cargo</a:t>
+            </a:r>
+            <a:r>
+              <a:rPr lang="en-GB" dirty="0" smtClean="0"/>
+              <a:t>”</a:t>
+            </a:r>
+          </a:p>
+          <a:p>
+            <a:endParaRPr lang="en-GB" dirty="0" smtClean="0"/>
+          </a:p>
+          <a:p>
             <a:endParaRPr lang="en-GB" dirty="0"/>
           </a:p>
-        </p:txBody>
-      </p:sp>
+          <a:p>
+            <a:endParaRPr lang="en-GB" dirty="0"/>
+          </a:p>
+        </p:txBody>
+      </p:sp>
+      <p:pic>
+        <p:nvPicPr>
+          <p:cNvPr id="1026" name="Picture 2" descr="https://scontent-lht6-1.xx.fbcdn.net/v/t35.0-12/17106094_1769857933331975_1963990198_o.jpg?oh=b856767500cb934ba15f5c97ebd09e10&amp;oe=58D428E7"/>
+          <p:cNvPicPr>
+            <a:picLocks noChangeAspect="1" noChangeArrowheads="1"/>
+          </p:cNvPicPr>
+          <p:nvPr/>
+        </p:nvPicPr>
+        <p:blipFill>
+          <a:blip r:embed="rId2" cstate="print">
+            <a:extLst>
+              <a:ext uri="{28A0092B-C50C-407E-A947-70E740481C1C}">
+                <a14:useLocalDpi xmlns:a14="http://schemas.microsoft.com/office/drawing/2010/main" val="0"/>
+              </a:ext>
+            </a:extLst>
+          </a:blip>
+          <a:srcRect/>
+          <a:stretch>
+            <a:fillRect/>
+          </a:stretch>
+        </p:blipFill>
+        <p:spPr bwMode="auto">
+          <a:xfrm>
+            <a:off x="551350" y="3544469"/>
+            <a:ext cx="3255306" cy="2429612"/>
+          </a:xfrm>
+          <a:prstGeom prst="rect">
+            <a:avLst/>
+          </a:prstGeom>
+          <a:noFill/>
+          <a:extLst>
+            <a:ext uri="{909E8E84-426E-40DD-AFC4-6F175D3DCCD1}">
+              <a14:hiddenFill xmlns:a14="http://schemas.microsoft.com/office/drawing/2010/main">
+                <a:solidFill>
+                  <a:srgbClr val="FFFFFF"/>
+                </a:solidFill>
+              </a14:hiddenFill>
+            </a:ext>
+          </a:extLst>
+        </p:spPr>
+      </p:pic>
+      <p:pic>
+        <p:nvPicPr>
+          <p:cNvPr id="1028" name="Picture 4" descr="https://scontent-lht6-1.xx.fbcdn.net/v/t35.0-12/17349092_10202570329576928_2041571990_o.jpg?oh=be4585495d49767da03c1115c80c40f6&amp;oe=58D45B91"/>
+          <p:cNvPicPr>
+            <a:picLocks noChangeAspect="1" noChangeArrowheads="1"/>
+          </p:cNvPicPr>
+          <p:nvPr/>
+        </p:nvPicPr>
+        <p:blipFill>
+          <a:blip r:embed="rId3" cstate="print">
+            <a:extLst>
+              <a:ext uri="{28A0092B-C50C-407E-A947-70E740481C1C}">
+                <a14:useLocalDpi xmlns:a14="http://schemas.microsoft.com/office/drawing/2010/main" val="0"/>
+              </a:ext>
+            </a:extLst>
+          </a:blip>
+          <a:srcRect/>
+          <a:stretch>
+            <a:fillRect/>
+          </a:stretch>
+        </p:blipFill>
+        <p:spPr bwMode="auto">
+          <a:xfrm>
+            <a:off x="7048500" y="3542695"/>
+            <a:ext cx="3241847" cy="2431385"/>
+          </a:xfrm>
+          <a:prstGeom prst="rect">
+            <a:avLst/>
+          </a:prstGeom>
+          <a:noFill/>
+          <a:extLst>
+            <a:ext uri="{909E8E84-426E-40DD-AFC4-6F175D3DCCD1}">
+              <a14:hiddenFill xmlns:a14="http://schemas.microsoft.com/office/drawing/2010/main">
+                <a:solidFill>
+                  <a:srgbClr val="FFFFFF"/>
+                </a:solidFill>
+              </a14:hiddenFill>
+            </a:ext>
+          </a:extLst>
+        </p:spPr>
+      </p:pic>
+      <p:pic>
+        <p:nvPicPr>
+          <p:cNvPr id="7" name="Picture 2" descr="https://scontent-lht6-1.xx.fbcdn.net/v/t35.0-12/17273624_1591137340904103_2094871502_o.jpg?oh=69a8aa29bbe9dcfa7e3c5cc9ee8b28e1&amp;oe=58D43623"/>
+          <p:cNvPicPr>
+            <a:picLocks noChangeAspect="1" noChangeArrowheads="1"/>
+          </p:cNvPicPr>
+          <p:nvPr/>
+        </p:nvPicPr>
+        <p:blipFill>
+          <a:blip r:embed="rId4" cstate="print">
+            <a:extLst>
+              <a:ext uri="{28A0092B-C50C-407E-A947-70E740481C1C}">
+                <a14:useLocalDpi xmlns:a14="http://schemas.microsoft.com/office/drawing/2010/main" val="0"/>
+              </a:ext>
+            </a:extLst>
+          </a:blip>
+          <a:srcRect/>
+          <a:stretch>
+            <a:fillRect/>
+          </a:stretch>
+        </p:blipFill>
+        <p:spPr bwMode="auto">
+          <a:xfrm>
+            <a:off x="3806656" y="3542696"/>
+            <a:ext cx="3241844" cy="2431384"/>
+          </a:xfrm>
+          <a:prstGeom prst="rect">
+            <a:avLst/>
+          </a:prstGeom>
+          <a:noFill/>
+          <a:extLst>
+            <a:ext uri="{909E8E84-426E-40DD-AFC4-6F175D3DCCD1}">
+              <a14:hiddenFill xmlns:a14="http://schemas.microsoft.com/office/drawing/2010/main">
+                <a:solidFill>
+                  <a:srgbClr val="FFFFFF"/>
+                </a:solidFill>
+              </a14:hiddenFill>
+            </a:ext>
+          </a:extLst>
+        </p:spPr>
+      </p:pic>
     </p:spTree>
     <p:extLst>
       <p:ext uri="{BB962C8B-B14F-4D97-AF65-F5344CB8AC3E}">
@@ -3243,6 +3986,672 @@
   <p:clrMapOvr>
     <a:masterClrMapping/>
   </p:clrMapOvr>
+  <p:timing>
+    <p:tnLst>
+      <p:par>
+        <p:cTn id="1" dur="indefinite" restart="never" nodeType="tmRoot"/>
+      </p:par>
+    </p:tnLst>
+  </p:timing>
+</p:sld>
+</file>
+
+<file path=ppt/slides/slide4.xml><?xml version="1.0" encoding="utf-8"?>
+<p:sld xmlns:a="http://schemas.openxmlformats.org/drawingml/2006/main" xmlns:r="http://schemas.openxmlformats.org/officeDocument/2006/relationships" xmlns:p="http://schemas.openxmlformats.org/presentationml/2006/main">
+  <p:cSld>
+    <p:spTree>
+      <p:nvGrpSpPr>
+        <p:cNvPr id="1" name=""/>
+        <p:cNvGrpSpPr/>
+        <p:nvPr/>
+      </p:nvGrpSpPr>
+      <p:grpSpPr>
+        <a:xfrm>
+          <a:off x="0" y="0"/>
+          <a:ext cx="0" cy="0"/>
+          <a:chOff x="0" y="0"/>
+          <a:chExt cx="0" cy="0"/>
+        </a:xfrm>
+      </p:grpSpPr>
+      <p:sp>
+        <p:nvSpPr>
+          <p:cNvPr id="2" name="Title 1"/>
+          <p:cNvSpPr>
+            <a:spLocks noGrp="1"/>
+          </p:cNvSpPr>
+          <p:nvPr>
+            <p:ph type="title"/>
+          </p:nvPr>
+        </p:nvSpPr>
+        <p:spPr/>
+        <p:txBody>
+          <a:bodyPr/>
+          <a:lstStyle/>
+          <a:p>
+            <a:r>
+              <a:rPr lang="en-GB" dirty="0" smtClean="0"/>
+              <a:t>Target </a:t>
+            </a:r>
+            <a:r>
+              <a:rPr lang="en-GB" dirty="0" smtClean="0"/>
+              <a:t>Market</a:t>
+            </a:r>
+            <a:endParaRPr lang="en-GB" dirty="0"/>
+          </a:p>
+        </p:txBody>
+      </p:sp>
+      <p:sp>
+        <p:nvSpPr>
+          <p:cNvPr id="3" name="Content Placeholder 2"/>
+          <p:cNvSpPr>
+            <a:spLocks noGrp="1"/>
+          </p:cNvSpPr>
+          <p:nvPr>
+            <p:ph idx="1"/>
+          </p:nvPr>
+        </p:nvSpPr>
+        <p:spPr/>
+        <p:txBody>
+          <a:bodyPr/>
+          <a:lstStyle/>
+          <a:p>
+            <a:r>
+              <a:rPr lang="en-GB" dirty="0" smtClean="0"/>
+              <a:t>Itchen required a solution </a:t>
+            </a:r>
+            <a:r>
+              <a:rPr lang="en-GB" dirty="0" smtClean="0"/>
+              <a:t>which:</a:t>
+            </a:r>
+          </a:p>
+          <a:p>
+            <a:pPr lvl="1"/>
+            <a:r>
+              <a:rPr lang="en-GB" dirty="0" smtClean="0"/>
+              <a:t>Has good cargo to UAV weight ratio</a:t>
+            </a:r>
+          </a:p>
+          <a:p>
+            <a:pPr lvl="1"/>
+            <a:r>
+              <a:rPr lang="en-GB" dirty="0" smtClean="0"/>
+              <a:t>Is safe for the users</a:t>
+            </a:r>
+          </a:p>
+          <a:p>
+            <a:pPr lvl="1"/>
+            <a:r>
+              <a:rPr lang="en-GB" dirty="0" smtClean="0"/>
+              <a:t>Is a low cost solution</a:t>
+            </a:r>
+          </a:p>
+          <a:p>
+            <a:r>
+              <a:rPr lang="en-GB" dirty="0" smtClean="0"/>
+              <a:t>We delivered a UAV which incorporates:</a:t>
+            </a:r>
+          </a:p>
+          <a:p>
+            <a:pPr lvl="1"/>
+            <a:r>
+              <a:rPr lang="en-GB" dirty="0" smtClean="0"/>
+              <a:t>Custom User interface</a:t>
+            </a:r>
+          </a:p>
+          <a:p>
+            <a:pPr lvl="1"/>
+            <a:r>
+              <a:rPr lang="en-GB" dirty="0" smtClean="0"/>
+              <a:t>Two way communications</a:t>
+            </a:r>
+          </a:p>
+          <a:p>
+            <a:pPr lvl="1"/>
+            <a:r>
+              <a:rPr lang="en-GB" dirty="0" smtClean="0"/>
+              <a:t>Automated Stabilisation</a:t>
+            </a:r>
+            <a:endParaRPr lang="en-GB" dirty="0" smtClean="0"/>
+          </a:p>
+          <a:p>
+            <a:pPr lvl="1"/>
+            <a:r>
+              <a:rPr lang="en-GB" dirty="0" smtClean="0"/>
+              <a:t>Assisted Cargo Acquisition</a:t>
+            </a:r>
+            <a:endParaRPr lang="en-GB" dirty="0" smtClean="0"/>
+          </a:p>
+          <a:p>
+            <a:endParaRPr lang="en-GB" dirty="0"/>
+          </a:p>
+          <a:p>
+            <a:endParaRPr lang="en-GB" dirty="0"/>
+          </a:p>
+        </p:txBody>
+      </p:sp>
+      <p:pic>
+        <p:nvPicPr>
+          <p:cNvPr id="4" name="Picture 3"/>
+          <p:cNvPicPr>
+            <a:picLocks noChangeAspect="1"/>
+          </p:cNvPicPr>
+          <p:nvPr/>
+        </p:nvPicPr>
+        <p:blipFill>
+          <a:blip r:embed="rId2"/>
+          <a:stretch>
+            <a:fillRect/>
+          </a:stretch>
+        </p:blipFill>
+        <p:spPr>
+          <a:xfrm>
+            <a:off x="7198613" y="1352550"/>
+            <a:ext cx="4829874" cy="5016500"/>
+          </a:xfrm>
+          <a:prstGeom prst="rect">
+            <a:avLst/>
+          </a:prstGeom>
+        </p:spPr>
+      </p:pic>
+    </p:spTree>
+    <p:extLst>
+      <p:ext uri="{BB962C8B-B14F-4D97-AF65-F5344CB8AC3E}">
+        <p14:creationId xmlns:p14="http://schemas.microsoft.com/office/powerpoint/2010/main" val="3902040986"/>
+      </p:ext>
+    </p:extLst>
+  </p:cSld>
+  <p:clrMapOvr>
+    <a:masterClrMapping/>
+  </p:clrMapOvr>
+  <p:timing>
+    <p:tnLst>
+      <p:par>
+        <p:cTn id="1" dur="indefinite" restart="never" nodeType="tmRoot"/>
+      </p:par>
+    </p:tnLst>
+  </p:timing>
+</p:sld>
+</file>
+
+<file path=ppt/slides/slide5.xml><?xml version="1.0" encoding="utf-8"?>
+<p:sld xmlns:a="http://schemas.openxmlformats.org/drawingml/2006/main" xmlns:r="http://schemas.openxmlformats.org/officeDocument/2006/relationships" xmlns:p="http://schemas.openxmlformats.org/presentationml/2006/main">
+  <p:cSld>
+    <p:spTree>
+      <p:nvGrpSpPr>
+        <p:cNvPr id="1" name=""/>
+        <p:cNvGrpSpPr/>
+        <p:nvPr/>
+      </p:nvGrpSpPr>
+      <p:grpSpPr>
+        <a:xfrm>
+          <a:off x="0" y="0"/>
+          <a:ext cx="0" cy="0"/>
+          <a:chOff x="0" y="0"/>
+          <a:chExt cx="0" cy="0"/>
+        </a:xfrm>
+      </p:grpSpPr>
+      <p:sp>
+        <p:nvSpPr>
+          <p:cNvPr id="2" name="Title 1"/>
+          <p:cNvSpPr>
+            <a:spLocks noGrp="1"/>
+          </p:cNvSpPr>
+          <p:nvPr>
+            <p:ph type="title"/>
+          </p:nvPr>
+        </p:nvSpPr>
+        <p:spPr/>
+        <p:txBody>
+          <a:bodyPr/>
+          <a:lstStyle/>
+          <a:p>
+            <a:r>
+              <a:rPr lang="en-GB" dirty="0" smtClean="0"/>
+              <a:t>Costings</a:t>
+            </a:r>
+            <a:endParaRPr lang="en-GB" dirty="0"/>
+          </a:p>
+        </p:txBody>
+      </p:sp>
+      <p:sp>
+        <p:nvSpPr>
+          <p:cNvPr id="3" name="Content Placeholder 2"/>
+          <p:cNvSpPr>
+            <a:spLocks noGrp="1"/>
+          </p:cNvSpPr>
+          <p:nvPr>
+            <p:ph idx="1"/>
+          </p:nvPr>
+        </p:nvSpPr>
+        <p:spPr/>
+        <p:txBody>
+          <a:bodyPr/>
+          <a:lstStyle/>
+          <a:p>
+            <a:r>
+              <a:rPr lang="en-GB" dirty="0" smtClean="0"/>
+              <a:t>Retail at £300 gives a profit margin of 46.7%</a:t>
+            </a:r>
+          </a:p>
+          <a:p>
+            <a:r>
+              <a:rPr lang="en-GB" dirty="0" smtClean="0"/>
+              <a:t>1228 units to be sold to breakeven (at a yield of 90%)</a:t>
+            </a:r>
+          </a:p>
+          <a:p>
+            <a:r>
+              <a:rPr lang="en-GB" dirty="0" smtClean="0"/>
+              <a:t>Expected that more UAVs needed for sustainable wide range delivery network </a:t>
+            </a:r>
+          </a:p>
+          <a:p>
+            <a:endParaRPr lang="en-GB" dirty="0"/>
+          </a:p>
+        </p:txBody>
+      </p:sp>
+    </p:spTree>
+    <p:extLst>
+      <p:ext uri="{BB962C8B-B14F-4D97-AF65-F5344CB8AC3E}">
+        <p14:creationId xmlns:p14="http://schemas.microsoft.com/office/powerpoint/2010/main" val="590669845"/>
+      </p:ext>
+    </p:extLst>
+  </p:cSld>
+  <p:clrMapOvr>
+    <a:masterClrMapping/>
+  </p:clrMapOvr>
+</p:sld>
+</file>
+
+<file path=ppt/slides/slide6.xml><?xml version="1.0" encoding="utf-8"?>
+<p:sld xmlns:a="http://schemas.openxmlformats.org/drawingml/2006/main" xmlns:r="http://schemas.openxmlformats.org/officeDocument/2006/relationships" xmlns:p="http://schemas.openxmlformats.org/presentationml/2006/main">
+  <p:cSld>
+    <p:spTree>
+      <p:nvGrpSpPr>
+        <p:cNvPr id="1" name=""/>
+        <p:cNvGrpSpPr/>
+        <p:nvPr/>
+      </p:nvGrpSpPr>
+      <p:grpSpPr>
+        <a:xfrm>
+          <a:off x="0" y="0"/>
+          <a:ext cx="0" cy="0"/>
+          <a:chOff x="0" y="0"/>
+          <a:chExt cx="0" cy="0"/>
+        </a:xfrm>
+      </p:grpSpPr>
+      <p:sp>
+        <p:nvSpPr>
+          <p:cNvPr id="2" name="Title 1"/>
+          <p:cNvSpPr>
+            <a:spLocks noGrp="1"/>
+          </p:cNvSpPr>
+          <p:nvPr>
+            <p:ph type="title"/>
+          </p:nvPr>
+        </p:nvSpPr>
+        <p:spPr/>
+        <p:txBody>
+          <a:bodyPr/>
+          <a:lstStyle/>
+          <a:p>
+            <a:r>
+              <a:rPr lang="en-GB" dirty="0" smtClean="0"/>
+              <a:t>Development</a:t>
+            </a:r>
+            <a:endParaRPr lang="en-GB" dirty="0"/>
+          </a:p>
+        </p:txBody>
+      </p:sp>
+      <p:sp>
+        <p:nvSpPr>
+          <p:cNvPr id="3" name="Content Placeholder 2"/>
+          <p:cNvSpPr>
+            <a:spLocks noGrp="1"/>
+          </p:cNvSpPr>
+          <p:nvPr>
+            <p:ph idx="1"/>
+          </p:nvPr>
+        </p:nvSpPr>
+        <p:spPr/>
+        <p:txBody>
+          <a:bodyPr/>
+          <a:lstStyle/>
+          <a:p>
+            <a:r>
+              <a:rPr lang="en-GB" dirty="0" smtClean="0"/>
+              <a:t>Hardware Sourcing</a:t>
+            </a:r>
+          </a:p>
+          <a:p>
+            <a:r>
+              <a:rPr lang="en-GB" dirty="0" smtClean="0"/>
+              <a:t>Software Development</a:t>
+            </a:r>
+          </a:p>
+          <a:p>
+            <a:r>
+              <a:rPr lang="en-GB" dirty="0" smtClean="0"/>
+              <a:t>Chassi</a:t>
+            </a:r>
+            <a:r>
+              <a:rPr lang="en-GB" dirty="0" smtClean="0"/>
+              <a:t>s Manufacture</a:t>
+            </a:r>
+          </a:p>
+          <a:p>
+            <a:r>
+              <a:rPr lang="en-GB" dirty="0" smtClean="0"/>
+              <a:t>System Integration</a:t>
+            </a:r>
+          </a:p>
+          <a:p>
+            <a:r>
+              <a:rPr lang="en-GB" dirty="0" smtClean="0"/>
+              <a:t>Full system tuning/testing</a:t>
+            </a:r>
+          </a:p>
+          <a:p>
+            <a:r>
+              <a:rPr lang="en-GB" dirty="0" smtClean="0"/>
+              <a:t>Documentation</a:t>
+            </a:r>
+          </a:p>
+          <a:p>
+            <a:endParaRPr lang="en-GB" dirty="0" smtClean="0"/>
+          </a:p>
+          <a:p>
+            <a:endParaRPr lang="en-GB" dirty="0"/>
+          </a:p>
+        </p:txBody>
+      </p:sp>
+      <p:graphicFrame>
+        <p:nvGraphicFramePr>
+          <p:cNvPr id="4" name="Object 3"/>
+          <p:cNvGraphicFramePr>
+            <a:graphicFrameLocks noChangeAspect="1"/>
+          </p:cNvGraphicFramePr>
+          <p:nvPr>
+            <p:extLst>
+              <p:ext uri="{D42A27DB-BD31-4B8C-83A1-F6EECF244321}">
+                <p14:modId xmlns:p14="http://schemas.microsoft.com/office/powerpoint/2010/main" val="3670607211"/>
+              </p:ext>
+            </p:extLst>
+          </p:nvPr>
+        </p:nvGraphicFramePr>
+        <p:xfrm>
+          <a:off x="5410095" y="2063750"/>
+          <a:ext cx="6781905" cy="4794250"/>
+        </p:xfrm>
+        <a:graphic>
+          <a:graphicData uri="http://schemas.openxmlformats.org/presentationml/2006/ole">
+            <mc:AlternateContent xmlns:mc="http://schemas.openxmlformats.org/markup-compatibility/2006">
+              <mc:Choice xmlns:v="urn:schemas-microsoft-com:vml" Requires="v">
+                <p:oleObj spid="_x0000_s3076" name="Acrobat Document" r:id="rId3" imgW="11344074" imgH="8019778" progId="Acrobat.Document.11">
+                  <p:embed/>
+                </p:oleObj>
+              </mc:Choice>
+              <mc:Fallback>
+                <p:oleObj name="Acrobat Document" r:id="rId3" imgW="11344074" imgH="8019778" progId="Acrobat.Document.11">
+                  <p:embed/>
+                  <p:pic>
+                    <p:nvPicPr>
+                      <p:cNvPr id="0" name=""/>
+                      <p:cNvPicPr/>
+                      <p:nvPr/>
+                    </p:nvPicPr>
+                    <p:blipFill>
+                      <a:blip r:embed="rId4"/>
+                      <a:stretch>
+                        <a:fillRect/>
+                      </a:stretch>
+                    </p:blipFill>
+                    <p:spPr>
+                      <a:xfrm>
+                        <a:off x="5410095" y="2063750"/>
+                        <a:ext cx="6781905" cy="4794250"/>
+                      </a:xfrm>
+                      <a:prstGeom prst="rect">
+                        <a:avLst/>
+                      </a:prstGeom>
+                    </p:spPr>
+                  </p:pic>
+                </p:oleObj>
+              </mc:Fallback>
+            </mc:AlternateContent>
+          </a:graphicData>
+        </a:graphic>
+      </p:graphicFrame>
+    </p:spTree>
+    <p:extLst>
+      <p:ext uri="{BB962C8B-B14F-4D97-AF65-F5344CB8AC3E}">
+        <p14:creationId xmlns:p14="http://schemas.microsoft.com/office/powerpoint/2010/main" val="2384791457"/>
+      </p:ext>
+    </p:extLst>
+  </p:cSld>
+  <p:clrMapOvr>
+    <a:masterClrMapping/>
+  </p:clrMapOvr>
+  <p:timing>
+    <p:tnLst>
+      <p:par>
+        <p:cTn id="1" dur="indefinite" restart="never" nodeType="tmRoot"/>
+      </p:par>
+    </p:tnLst>
+  </p:timing>
+</p:sld>
+</file>
+
+<file path=ppt/slides/slide7.xml><?xml version="1.0" encoding="utf-8"?>
+<p:sld xmlns:a="http://schemas.openxmlformats.org/drawingml/2006/main" xmlns:r="http://schemas.openxmlformats.org/officeDocument/2006/relationships" xmlns:p="http://schemas.openxmlformats.org/presentationml/2006/main">
+  <p:cSld>
+    <p:spTree>
+      <p:nvGrpSpPr>
+        <p:cNvPr id="1" name=""/>
+        <p:cNvGrpSpPr/>
+        <p:nvPr/>
+      </p:nvGrpSpPr>
+      <p:grpSpPr>
+        <a:xfrm>
+          <a:off x="0" y="0"/>
+          <a:ext cx="0" cy="0"/>
+          <a:chOff x="0" y="0"/>
+          <a:chExt cx="0" cy="0"/>
+        </a:xfrm>
+      </p:grpSpPr>
+      <p:sp>
+        <p:nvSpPr>
+          <p:cNvPr id="2" name="Title 1"/>
+          <p:cNvSpPr>
+            <a:spLocks noGrp="1"/>
+          </p:cNvSpPr>
+          <p:nvPr>
+            <p:ph type="title"/>
+          </p:nvPr>
+        </p:nvSpPr>
+        <p:spPr/>
+        <p:txBody>
+          <a:bodyPr/>
+          <a:lstStyle/>
+          <a:p>
+            <a:r>
+              <a:rPr lang="en-GB" dirty="0" smtClean="0"/>
+              <a:t>Problems</a:t>
+            </a:r>
+            <a:endParaRPr lang="en-GB" dirty="0"/>
+          </a:p>
+        </p:txBody>
+      </p:sp>
+      <p:sp>
+        <p:nvSpPr>
+          <p:cNvPr id="3" name="Content Placeholder 2"/>
+          <p:cNvSpPr>
+            <a:spLocks noGrp="1"/>
+          </p:cNvSpPr>
+          <p:nvPr>
+            <p:ph idx="1"/>
+          </p:nvPr>
+        </p:nvSpPr>
+        <p:spPr/>
+        <p:txBody>
+          <a:bodyPr/>
+          <a:lstStyle/>
+          <a:p>
+            <a:r>
+              <a:rPr lang="en-GB" dirty="0" smtClean="0"/>
+              <a:t>Didn’t fly reliably</a:t>
+            </a:r>
+          </a:p>
+          <a:p>
+            <a:r>
+              <a:rPr lang="en-GB" dirty="0" smtClean="0"/>
+              <a:t>Heavy - &gt;900g</a:t>
+            </a:r>
+          </a:p>
+          <a:p>
+            <a:r>
+              <a:rPr lang="en-GB" dirty="0" smtClean="0"/>
+              <a:t>Small </a:t>
+            </a:r>
+            <a:r>
+              <a:rPr lang="en-GB" dirty="0" smtClean="0"/>
+              <a:t>Propellers </a:t>
+            </a:r>
+          </a:p>
+          <a:p>
+            <a:endParaRPr lang="en-GB" dirty="0"/>
+          </a:p>
+        </p:txBody>
+      </p:sp>
+    </p:spTree>
+    <p:extLst>
+      <p:ext uri="{BB962C8B-B14F-4D97-AF65-F5344CB8AC3E}">
+        <p14:creationId xmlns:p14="http://schemas.microsoft.com/office/powerpoint/2010/main" val="606798794"/>
+      </p:ext>
+    </p:extLst>
+  </p:cSld>
+  <p:clrMapOvr>
+    <a:masterClrMapping/>
+  </p:clrMapOvr>
+  <p:timing>
+    <p:tnLst>
+      <p:par>
+        <p:cTn id="1" dur="indefinite" restart="never" nodeType="tmRoot"/>
+      </p:par>
+    </p:tnLst>
+  </p:timing>
+</p:sld>
+</file>
+
+<file path=ppt/slides/slide8.xml><?xml version="1.0" encoding="utf-8"?>
+<p:sld xmlns:a="http://schemas.openxmlformats.org/drawingml/2006/main" xmlns:r="http://schemas.openxmlformats.org/officeDocument/2006/relationships" xmlns:p="http://schemas.openxmlformats.org/presentationml/2006/main">
+  <p:cSld>
+    <p:spTree>
+      <p:nvGrpSpPr>
+        <p:cNvPr id="1" name=""/>
+        <p:cNvGrpSpPr/>
+        <p:nvPr/>
+      </p:nvGrpSpPr>
+      <p:grpSpPr>
+        <a:xfrm>
+          <a:off x="0" y="0"/>
+          <a:ext cx="0" cy="0"/>
+          <a:chOff x="0" y="0"/>
+          <a:chExt cx="0" cy="0"/>
+        </a:xfrm>
+      </p:grpSpPr>
+      <p:sp>
+        <p:nvSpPr>
+          <p:cNvPr id="2" name="Title 1"/>
+          <p:cNvSpPr>
+            <a:spLocks noGrp="1"/>
+          </p:cNvSpPr>
+          <p:nvPr>
+            <p:ph type="title"/>
+          </p:nvPr>
+        </p:nvSpPr>
+        <p:spPr/>
+        <p:txBody>
+          <a:bodyPr/>
+          <a:lstStyle/>
+          <a:p>
+            <a:r>
+              <a:rPr lang="en-GB" dirty="0" smtClean="0"/>
+              <a:t>Solutions and the Future</a:t>
+            </a:r>
+            <a:endParaRPr lang="en-GB" dirty="0"/>
+          </a:p>
+        </p:txBody>
+      </p:sp>
+      <p:sp>
+        <p:nvSpPr>
+          <p:cNvPr id="3" name="Content Placeholder 2"/>
+          <p:cNvSpPr>
+            <a:spLocks noGrp="1"/>
+          </p:cNvSpPr>
+          <p:nvPr>
+            <p:ph idx="1"/>
+          </p:nvPr>
+        </p:nvSpPr>
+        <p:spPr/>
+        <p:txBody>
+          <a:bodyPr/>
+          <a:lstStyle/>
+          <a:p>
+            <a:r>
+              <a:rPr lang="en-GB" dirty="0" smtClean="0"/>
+              <a:t>Close to good stability </a:t>
+            </a:r>
+            <a:endParaRPr lang="en-GB" dirty="0"/>
+          </a:p>
+        </p:txBody>
+      </p:sp>
+      <p:sp>
+        <p:nvSpPr>
+          <p:cNvPr id="4" name="TextBox 3"/>
+          <p:cNvSpPr txBox="1"/>
+          <p:nvPr/>
+        </p:nvSpPr>
+        <p:spPr>
+          <a:xfrm>
+            <a:off x="0" y="6218019"/>
+            <a:ext cx="3556000" cy="646331"/>
+          </a:xfrm>
+          <a:prstGeom prst="rect">
+            <a:avLst/>
+          </a:prstGeom>
+          <a:noFill/>
+        </p:spPr>
+        <p:txBody>
+          <a:bodyPr wrap="square" rtlCol="0">
+            <a:spAutoFit/>
+          </a:bodyPr>
+          <a:lstStyle/>
+          <a:p>
+            <a:r>
+              <a:rPr lang="en-GB" dirty="0" smtClean="0"/>
+              <a:t>All image and content acknowledgement to Team Ganges</a:t>
+            </a:r>
+          </a:p>
+        </p:txBody>
+      </p:sp>
+    </p:spTree>
+    <p:extLst>
+      <p:ext uri="{BB962C8B-B14F-4D97-AF65-F5344CB8AC3E}">
+        <p14:creationId xmlns:p14="http://schemas.microsoft.com/office/powerpoint/2010/main" val="1439976661"/>
+      </p:ext>
+    </p:extLst>
+  </p:cSld>
+  <p:clrMapOvr>
+    <a:masterClrMapping/>
+  </p:clrMapOvr>
+  <p:timing>
+    <p:tnLst>
+      <p:par>
+        <p:cTn id="1" dur="indefinite" restart="never" nodeType="tmRoot"/>
+      </p:par>
+    </p:tnLst>
+  </p:timing>
 </p:sld>
 </file>
 
@@ -3505,4 +4914,265 @@
     </a:ext>
   </a:extLst>
 </a:theme>
+</file>
+
+<file path=ppt/theme/theme2.xml><?xml version="1.0" encoding="utf-8"?>
+<a:theme xmlns:a="http://schemas.openxmlformats.org/drawingml/2006/main" name="Office Theme">
+  <a:themeElements>
+    <a:clrScheme name="Office">
+      <a:dk1>
+        <a:sysClr val="windowText" lastClr="000000"/>
+      </a:dk1>
+      <a:lt1>
+        <a:sysClr val="window" lastClr="FFFFFF"/>
+      </a:lt1>
+      <a:dk2>
+        <a:srgbClr val="44546A"/>
+      </a:dk2>
+      <a:lt2>
+        <a:srgbClr val="E7E6E6"/>
+      </a:lt2>
+      <a:accent1>
+        <a:srgbClr val="5B9BD5"/>
+      </a:accent1>
+      <a:accent2>
+        <a:srgbClr val="ED7D31"/>
+      </a:accent2>
+      <a:accent3>
+        <a:srgbClr val="A5A5A5"/>
+      </a:accent3>
+      <a:accent4>
+        <a:srgbClr val="FFC000"/>
+      </a:accent4>
+      <a:accent5>
+        <a:srgbClr val="4472C4"/>
+      </a:accent5>
+      <a:accent6>
+        <a:srgbClr val="70AD47"/>
+      </a:accent6>
+      <a:hlink>
+        <a:srgbClr val="0563C1"/>
+      </a:hlink>
+      <a:folHlink>
+        <a:srgbClr val="954F72"/>
+      </a:folHlink>
+    </a:clrScheme>
+    <a:fontScheme name="Office">
+      <a:majorFont>
+        <a:latin typeface="Calibri Light" panose="020F0302020204030204"/>
+        <a:ea typeface=""/>
+        <a:cs typeface=""/>
+        <a:font script="Jpan" typeface="游ゴシック Light"/>
+        <a:font script="Hang" typeface="맑은 고딕"/>
+        <a:font script="Hans" typeface="等线 Light"/>
+        <a:font script="Hant" typeface="新細明體"/>
+        <a:font script="Arab" typeface="Times New Roman"/>
+        <a:font script="Hebr" typeface="Times New Roman"/>
+        <a:font script="Thai" typeface="Angsana New"/>
+        <a:font script="Ethi" typeface="Nyala"/>
+        <a:font script="Beng" typeface="Vrinda"/>
+        <a:font script="Gujr" typeface="Shruti"/>
+        <a:font script="Khmr" typeface="MoolBoran"/>
+        <a:font script="Knda" typeface="Tunga"/>
+        <a:font script="Guru" typeface="Raavi"/>
+        <a:font script="Cans" typeface="Euphemia"/>
+        <a:font script="Cher" typeface="Plantagenet Cherokee"/>
+        <a:font script="Yiii" typeface="Microsoft Yi Baiti"/>
+        <a:font script="Tibt" typeface="Microsoft Himalaya"/>
+        <a:font script="Thaa" typeface="MV Boli"/>
+        <a:font script="Deva" typeface="Mangal"/>
+        <a:font script="Telu" typeface="Gautami"/>
+        <a:font script="Taml" typeface="Latha"/>
+        <a:font script="Syrc" typeface="Estrangelo Edessa"/>
+        <a:font script="Orya" typeface="Kalinga"/>
+        <a:font script="Mlym" typeface="Kartika"/>
+        <a:font script="Laoo" typeface="DokChampa"/>
+        <a:font script="Sinh" typeface="Iskoola Pota"/>
+        <a:font script="Mong" typeface="Mongolian Baiti"/>
+        <a:font script="Viet" typeface="Times New Roman"/>
+        <a:font script="Uigh" typeface="Microsoft Uighur"/>
+        <a:font script="Geor" typeface="Sylfaen"/>
+      </a:majorFont>
+      <a:minorFont>
+        <a:latin typeface="Calibri" panose="020F0502020204030204"/>
+        <a:ea typeface=""/>
+        <a:cs typeface=""/>
+        <a:font script="Jpan" typeface="游ゴシック"/>
+        <a:font script="Hang" typeface="맑은 고딕"/>
+        <a:font script="Hans" typeface="等线"/>
+        <a:font script="Hant" typeface="新細明體"/>
+        <a:font script="Arab" typeface="Arial"/>
+        <a:font script="Hebr" typeface="Arial"/>
+        <a:font script="Thai" typeface="Cordia New"/>
+        <a:font script="Ethi" typeface="Nyala"/>
+        <a:font script="Beng" typeface="Vrinda"/>
+        <a:font script="Gujr" typeface="Shruti"/>
+        <a:font script="Khmr" typeface="DaunPenh"/>
+        <a:font script="Knda" typeface="Tunga"/>
+        <a:font script="Guru" typeface="Raavi"/>
+        <a:font script="Cans" typeface="Euphemia"/>
+        <a:font script="Cher" typeface="Plantagenet Cherokee"/>
+        <a:font script="Yiii" typeface="Microsoft Yi Baiti"/>
+        <a:font script="Tibt" typeface="Microsoft Himalaya"/>
+        <a:font script="Thaa" typeface="MV Boli"/>
+        <a:font script="Deva" typeface="Mangal"/>
+        <a:font script="Telu" typeface="Gautami"/>
+        <a:font script="Taml" typeface="Latha"/>
+        <a:font script="Syrc" typeface="Estrangelo Edessa"/>
+        <a:font script="Orya" typeface="Kalinga"/>
+        <a:font script="Mlym" typeface="Kartika"/>
+        <a:font script="Laoo" typeface="DokChampa"/>
+        <a:font script="Sinh" typeface="Iskoola Pota"/>
+        <a:font script="Mong" typeface="Mongolian Baiti"/>
+        <a:font script="Viet" typeface="Arial"/>
+        <a:font script="Uigh" typeface="Microsoft Uighur"/>
+        <a:font script="Geor" typeface="Sylfaen"/>
+      </a:minorFont>
+    </a:fontScheme>
+    <a:fmtScheme name="Office">
+      <a:fillStyleLst>
+        <a:solidFill>
+          <a:schemeClr val="phClr"/>
+        </a:solidFill>
+        <a:gradFill rotWithShape="1">
+          <a:gsLst>
+            <a:gs pos="0">
+              <a:schemeClr val="phClr">
+                <a:lumMod val="110000"/>
+                <a:satMod val="105000"/>
+                <a:tint val="67000"/>
+              </a:schemeClr>
+            </a:gs>
+            <a:gs pos="50000">
+              <a:schemeClr val="phClr">
+                <a:lumMod val="105000"/>
+                <a:satMod val="103000"/>
+                <a:tint val="73000"/>
+              </a:schemeClr>
+            </a:gs>
+            <a:gs pos="100000">
+              <a:schemeClr val="phClr">
+                <a:lumMod val="105000"/>
+                <a:satMod val="109000"/>
+                <a:tint val="81000"/>
+              </a:schemeClr>
+            </a:gs>
+          </a:gsLst>
+          <a:lin ang="5400000" scaled="0"/>
+        </a:gradFill>
+        <a:gradFill rotWithShape="1">
+          <a:gsLst>
+            <a:gs pos="0">
+              <a:schemeClr val="phClr">
+                <a:satMod val="103000"/>
+                <a:lumMod val="102000"/>
+                <a:tint val="94000"/>
+              </a:schemeClr>
+            </a:gs>
+            <a:gs pos="50000">
+              <a:schemeClr val="phClr">
+                <a:satMod val="110000"/>
+                <a:lumMod val="100000"/>
+                <a:shade val="100000"/>
+              </a:schemeClr>
+            </a:gs>
+            <a:gs pos="100000">
+              <a:schemeClr val="phClr">
+                <a:lumMod val="99000"/>
+                <a:satMod val="120000"/>
+                <a:shade val="78000"/>
+              </a:schemeClr>
+            </a:gs>
+          </a:gsLst>
+          <a:lin ang="5400000" scaled="0"/>
+        </a:gradFill>
+      </a:fillStyleLst>
+      <a:lnStyleLst>
+        <a:ln w="6350" cap="flat" cmpd="sng" algn="ctr">
+          <a:solidFill>
+            <a:schemeClr val="phClr"/>
+          </a:solidFill>
+          <a:prstDash val="solid"/>
+          <a:miter lim="800000"/>
+        </a:ln>
+        <a:ln w="12700" cap="flat" cmpd="sng" algn="ctr">
+          <a:solidFill>
+            <a:schemeClr val="phClr"/>
+          </a:solidFill>
+          <a:prstDash val="solid"/>
+          <a:miter lim="800000"/>
+        </a:ln>
+        <a:ln w="19050" cap="flat" cmpd="sng" algn="ctr">
+          <a:solidFill>
+            <a:schemeClr val="phClr"/>
+          </a:solidFill>
+          <a:prstDash val="solid"/>
+          <a:miter lim="800000"/>
+        </a:ln>
+      </a:lnStyleLst>
+      <a:effectStyleLst>
+        <a:effectStyle>
+          <a:effectLst/>
+        </a:effectStyle>
+        <a:effectStyle>
+          <a:effectLst/>
+        </a:effectStyle>
+        <a:effectStyle>
+          <a:effectLst>
+            <a:outerShdw blurRad="57150" dist="19050" dir="5400000" algn="ctr" rotWithShape="0">
+              <a:srgbClr val="000000">
+                <a:alpha val="63000"/>
+              </a:srgbClr>
+            </a:outerShdw>
+          </a:effectLst>
+        </a:effectStyle>
+      </a:effectStyleLst>
+      <a:bgFillStyleLst>
+        <a:solidFill>
+          <a:schemeClr val="phClr"/>
+        </a:solidFill>
+        <a:solidFill>
+          <a:schemeClr val="phClr">
+            <a:tint val="95000"/>
+            <a:satMod val="170000"/>
+          </a:schemeClr>
+        </a:solidFill>
+        <a:gradFill rotWithShape="1">
+          <a:gsLst>
+            <a:gs pos="0">
+              <a:schemeClr val="phClr">
+                <a:tint val="93000"/>
+                <a:satMod val="150000"/>
+                <a:shade val="98000"/>
+                <a:lumMod val="102000"/>
+              </a:schemeClr>
+            </a:gs>
+            <a:gs pos="50000">
+              <a:schemeClr val="phClr">
+                <a:tint val="98000"/>
+                <a:satMod val="130000"/>
+                <a:shade val="90000"/>
+                <a:lumMod val="103000"/>
+              </a:schemeClr>
+            </a:gs>
+            <a:gs pos="100000">
+              <a:schemeClr val="phClr">
+                <a:shade val="63000"/>
+                <a:satMod val="120000"/>
+              </a:schemeClr>
+            </a:gs>
+          </a:gsLst>
+          <a:lin ang="5400000" scaled="0"/>
+        </a:gradFill>
+      </a:bgFillStyleLst>
+    </a:fmtScheme>
+  </a:themeElements>
+  <a:objectDefaults/>
+  <a:extraClrSchemeLst/>
+  <a:extLst>
+    <a:ext uri="{05A4C25C-085E-4340-85A3-A5531E510DB2}">
+      <thm15:themeFamily xmlns:thm15="http://schemas.microsoft.com/office/thememl/2012/main" name="Office Theme" id="{62F939B6-93AF-4DB8-9C6B-D6C7DFDC589F}" vid="{4A3C46E8-61CC-4603-A589-7422A47A8E4A}"/>
+    </a:ext>
+  </a:extLst>
+</a:theme>
 </file>
</xml_diff>